<commit_message>
profile pics to presentation
</commit_message>
<xml_diff>
--- a/Presentation/VRaid Abschlusspräsentation.pptx
+++ b/Presentation/VRaid Abschlusspräsentation.pptx
@@ -2701,7 +2701,6 @@
           <a:bodyPr rtlCol="0" anchor="ctr"/>
           <a:lstStyle/>
           <a:p>
-            <a:pPr algn="ctr"/>
             <a:r>
               <a:rPr lang="en-US" sz="1200" cap="small" spc="120" dirty="0">
                 <a:solidFill>
@@ -2734,7 +2733,6 @@
             </a:endParaRPr>
           </a:p>
           <a:p>
-            <a:pPr algn="ctr"/>
             <a:r>
               <a:rPr lang="en-US" sz="1200" cap="small" spc="120" dirty="0">
                 <a:solidFill>
@@ -2748,7 +2746,6 @@
             </a:r>
           </a:p>
           <a:p>
-            <a:pPr algn="ctr"/>
             <a:r>
               <a:rPr lang="en-US" sz="1200" cap="small" spc="120" dirty="0">
                 <a:solidFill>
@@ -2817,9 +2814,8 @@
           </a:bodyPr>
           <a:lstStyle/>
           <a:p>
-            <a:pPr algn="ctr"/>
-            <a:r>
-              <a:rPr lang="en-US" sz="1200" cap="small" spc="120">
+            <a:r>
+              <a:rPr lang="en-US" sz="1200" cap="small" spc="120" dirty="0" err="1">
                 <a:solidFill>
                   <a:schemeClr val="tx1"/>
                 </a:solidFill>
@@ -2827,7 +2823,29 @@
                 <a:ea typeface="+mj-ea"/>
                 <a:cs typeface="+mj-cs"/>
               </a:rPr>
-              <a:t>Kliment Sokolov</a:t>
+              <a:t>Kliment</a:t>
+            </a:r>
+            <a:r>
+              <a:rPr lang="en-US" sz="1200" cap="small" spc="120" dirty="0">
+                <a:solidFill>
+                  <a:schemeClr val="tx1"/>
+                </a:solidFill>
+                <a:latin typeface="Arial Nova"/>
+                <a:ea typeface="+mj-ea"/>
+                <a:cs typeface="+mj-cs"/>
+              </a:rPr>
+              <a:t> </a:t>
+            </a:r>
+            <a:r>
+              <a:rPr lang="en-US" sz="1200" cap="small" spc="120" dirty="0" err="1">
+                <a:solidFill>
+                  <a:schemeClr val="tx1"/>
+                </a:solidFill>
+                <a:latin typeface="Arial Nova"/>
+                <a:ea typeface="+mj-ea"/>
+                <a:cs typeface="+mj-cs"/>
+              </a:rPr>
+              <a:t>Sokolov</a:t>
             </a:r>
             <a:endParaRPr lang="en-US" sz="1200" cap="small" spc="120" dirty="0">
               <a:solidFill>
@@ -2839,18 +2857,6 @@
             </a:endParaRPr>
           </a:p>
           <a:p>
-            <a:pPr algn="ctr"/>
-            <a:r>
-              <a:rPr lang="en-US" sz="1200" cap="small" spc="120">
-                <a:solidFill>
-                  <a:schemeClr val="tx1"/>
-                </a:solidFill>
-                <a:latin typeface="Arial Nova"/>
-                <a:ea typeface="+mj-ea"/>
-                <a:cs typeface="+mj-cs"/>
-              </a:rPr>
-              <a:t>M. </a:t>
-            </a:r>
             <a:r>
               <a:rPr lang="en-US" sz="1200" cap="small" spc="120" dirty="0">
                 <a:solidFill>
@@ -2860,22 +2866,10 @@
                 <a:ea typeface="+mj-ea"/>
                 <a:cs typeface="+mj-cs"/>
               </a:rPr>
-              <a:t>Sc. Informatics</a:t>
-            </a:r>
-          </a:p>
-          <a:p>
-            <a:pPr algn="ctr"/>
-            <a:r>
-              <a:rPr lang="en-US" sz="1200" cap="small" spc="120">
-                <a:solidFill>
-                  <a:schemeClr val="tx1"/>
-                </a:solidFill>
-                <a:latin typeface="Arial Nova"/>
-                <a:ea typeface="+mj-ea"/>
-                <a:cs typeface="+mj-cs"/>
-              </a:rPr>
-              <a:t>University of Konstan</a:t>
-            </a:r>
+              <a:t>M. Sc. Informatics</a:t>
+            </a:r>
+          </a:p>
+          <a:p>
             <a:r>
               <a:rPr lang="en-US" sz="1200" cap="small" spc="120" dirty="0">
                 <a:solidFill>
@@ -2885,7 +2879,7 @@
                 <a:ea typeface="+mj-ea"/>
                 <a:cs typeface="+mj-cs"/>
               </a:rPr>
-              <a:t>z</a:t>
+              <a:t>University of Konstanz</a:t>
             </a:r>
           </a:p>
         </p:txBody>
@@ -2944,7 +2938,6 @@
           </a:bodyPr>
           <a:lstStyle/>
           <a:p>
-            <a:pPr algn="ctr"/>
             <a:r>
               <a:rPr lang="en-US" sz="1200" cap="small" spc="120">
                 <a:solidFill>
@@ -2966,7 +2959,6 @@
             </a:endParaRPr>
           </a:p>
           <a:p>
-            <a:pPr algn="ctr"/>
             <a:r>
               <a:rPr lang="en-US" sz="1200" cap="small" spc="120">
                 <a:solidFill>
@@ -2988,7 +2980,6 @@
             </a:endParaRPr>
           </a:p>
           <a:p>
-            <a:pPr algn="ctr"/>
             <a:r>
               <a:rPr lang="en-US" sz="1200" cap="small" spc="120">
                 <a:solidFill>
@@ -3065,7 +3056,6 @@
           </a:bodyPr>
           <a:lstStyle/>
           <a:p>
-            <a:pPr algn="ctr"/>
             <a:r>
               <a:rPr lang="en-US" sz="1200" cap="small" spc="120">
                 <a:solidFill>
@@ -3087,7 +3077,6 @@
             </a:endParaRPr>
           </a:p>
           <a:p>
-            <a:pPr algn="ctr"/>
             <a:r>
               <a:rPr lang="en-US" sz="1200" cap="small" spc="120">
                 <a:solidFill>
@@ -3112,7 +3101,6 @@
             </a:r>
           </a:p>
           <a:p>
-            <a:pPr algn="ctr"/>
             <a:r>
               <a:rPr lang="en-US" sz="1200" cap="small" spc="120">
                 <a:solidFill>
@@ -3444,6 +3432,150 @@
           </a:p>
         </p:txBody>
       </p:sp>
+      <p:pic>
+        <p:nvPicPr>
+          <p:cNvPr id="15" name="Grafik 14">
+            <a:extLst>
+              <a:ext uri="{FF2B5EF4-FFF2-40B4-BE49-F238E27FC236}">
+                <a16:creationId xmlns:a16="http://schemas.microsoft.com/office/drawing/2014/main" id="{474D6E5C-D065-4725-BCE9-7A7C335D24F1}"/>
+              </a:ext>
+            </a:extLst>
+          </p:cNvPr>
+          <p:cNvPicPr>
+            <a:picLocks noChangeAspect="1"/>
+          </p:cNvPicPr>
+          <p:nvPr/>
+        </p:nvPicPr>
+        <p:blipFill>
+          <a:blip r:embed="rId2">
+            <a:extLst>
+              <a:ext uri="{28A0092B-C50C-407E-A947-70E740481C1C}">
+                <a14:useLocalDpi xmlns:a14="http://schemas.microsoft.com/office/drawing/2010/main" val="0"/>
+              </a:ext>
+            </a:extLst>
+          </a:blip>
+          <a:stretch>
+            <a:fillRect/>
+          </a:stretch>
+        </p:blipFill>
+        <p:spPr>
+          <a:xfrm>
+            <a:off x="3581400" y="4557401"/>
+            <a:ext cx="1328938" cy="1328938"/>
+          </a:xfrm>
+          <a:prstGeom prst="rect">
+            <a:avLst/>
+          </a:prstGeom>
+        </p:spPr>
+      </p:pic>
+      <p:pic>
+        <p:nvPicPr>
+          <p:cNvPr id="17" name="Grafik 16">
+            <a:extLst>
+              <a:ext uri="{FF2B5EF4-FFF2-40B4-BE49-F238E27FC236}">
+                <a16:creationId xmlns:a16="http://schemas.microsoft.com/office/drawing/2014/main" id="{A5B06810-2466-40C8-864C-5CE8D631314F}"/>
+              </a:ext>
+            </a:extLst>
+          </p:cNvPr>
+          <p:cNvPicPr>
+            <a:picLocks noChangeAspect="1"/>
+          </p:cNvPicPr>
+          <p:nvPr/>
+        </p:nvPicPr>
+        <p:blipFill>
+          <a:blip r:embed="rId3">
+            <a:extLst>
+              <a:ext uri="{28A0092B-C50C-407E-A947-70E740481C1C}">
+                <a14:useLocalDpi xmlns:a14="http://schemas.microsoft.com/office/drawing/2010/main" val="0"/>
+              </a:ext>
+            </a:extLst>
+          </a:blip>
+          <a:stretch>
+            <a:fillRect/>
+          </a:stretch>
+        </p:blipFill>
+        <p:spPr>
+          <a:xfrm>
+            <a:off x="3581938" y="2288881"/>
+            <a:ext cx="1328400" cy="1328400"/>
+          </a:xfrm>
+          <a:prstGeom prst="rect">
+            <a:avLst/>
+          </a:prstGeom>
+        </p:spPr>
+      </p:pic>
+      <p:pic>
+        <p:nvPicPr>
+          <p:cNvPr id="19" name="Grafik 18">
+            <a:extLst>
+              <a:ext uri="{FF2B5EF4-FFF2-40B4-BE49-F238E27FC236}">
+                <a16:creationId xmlns:a16="http://schemas.microsoft.com/office/drawing/2014/main" id="{09D6E46E-C037-4FE1-852E-CD0C56768967}"/>
+              </a:ext>
+            </a:extLst>
+          </p:cNvPr>
+          <p:cNvPicPr>
+            <a:picLocks noChangeAspect="1"/>
+          </p:cNvPicPr>
+          <p:nvPr/>
+        </p:nvPicPr>
+        <p:blipFill>
+          <a:blip r:embed="rId4">
+            <a:extLst>
+              <a:ext uri="{28A0092B-C50C-407E-A947-70E740481C1C}">
+                <a14:useLocalDpi xmlns:a14="http://schemas.microsoft.com/office/drawing/2010/main" val="0"/>
+              </a:ext>
+            </a:extLst>
+          </a:blip>
+          <a:stretch>
+            <a:fillRect/>
+          </a:stretch>
+        </p:blipFill>
+        <p:spPr>
+          <a:xfrm>
+            <a:off x="8922818" y="4557939"/>
+            <a:ext cx="1327316" cy="1328400"/>
+          </a:xfrm>
+          <a:prstGeom prst="rect">
+            <a:avLst/>
+          </a:prstGeom>
+        </p:spPr>
+      </p:pic>
+      <p:pic>
+        <p:nvPicPr>
+          <p:cNvPr id="21" name="Grafik 20">
+            <a:extLst>
+              <a:ext uri="{FF2B5EF4-FFF2-40B4-BE49-F238E27FC236}">
+                <a16:creationId xmlns:a16="http://schemas.microsoft.com/office/drawing/2014/main" id="{42D06E59-C000-43B0-BEF5-1DE2A8E22D49}"/>
+              </a:ext>
+            </a:extLst>
+          </p:cNvPr>
+          <p:cNvPicPr>
+            <a:picLocks noChangeAspect="1"/>
+          </p:cNvPicPr>
+          <p:nvPr/>
+        </p:nvPicPr>
+        <p:blipFill>
+          <a:blip r:embed="rId5">
+            <a:extLst>
+              <a:ext uri="{28A0092B-C50C-407E-A947-70E740481C1C}">
+                <a14:useLocalDpi xmlns:a14="http://schemas.microsoft.com/office/drawing/2010/main" val="0"/>
+              </a:ext>
+            </a:extLst>
+          </a:blip>
+          <a:stretch>
+            <a:fillRect/>
+          </a:stretch>
+        </p:blipFill>
+        <p:spPr>
+          <a:xfrm>
+            <a:off x="8922818" y="2288881"/>
+            <a:ext cx="1326926" cy="1328400"/>
+          </a:xfrm>
+          <a:prstGeom prst="rect">
+            <a:avLst/>
+          </a:prstGeom>
+        </p:spPr>
+      </p:pic>
     </p:spTree>
     <p:extLst>
       <p:ext uri="{BB962C8B-B14F-4D97-AF65-F5344CB8AC3E}">

</xml_diff>